<commit_message>
add pdf build script
</commit_message>
<xml_diff>
--- a/infrastructure-week-4.pptx
+++ b/infrastructure-week-4.pptx
@@ -44,7 +44,9 @@
     <p:sldId id="294" r:id="rId38"/>
     <p:sldId id="295" r:id="rId39"/>
     <p:sldId id="296" r:id="rId40"/>
-    <p:sldId id="259" r:id="rId41"/>
+    <p:sldId id="297" r:id="rId41"/>
+    <p:sldId id="298" r:id="rId42"/>
+    <p:sldId id="259" r:id="rId43"/>
   </p:sldIdLst>
   <p:sldSz cx="9144000" cy="6858000" type="screen4x3"/>
   <p:notesSz cx="6858000" cy="9144000"/>
@@ -11241,6 +11243,800 @@
         </p:nvSpPr>
         <p:spPr/>
         <p:txBody>
+          <a:bodyPr/>
+          <a:lstStyle/>
+          <a:p>
+            <a:r>
+              <a:rPr lang="en-US" dirty="0" smtClean="0"/>
+              <a:t>Security Groups</a:t>
+            </a:r>
+            <a:endParaRPr lang="en-US" dirty="0"/>
+          </a:p>
+        </p:txBody>
+      </p:sp>
+      <p:sp>
+        <p:nvSpPr>
+          <p:cNvPr id="3" name="Content Placeholder 2"/>
+          <p:cNvSpPr>
+            <a:spLocks noGrp="1"/>
+          </p:cNvSpPr>
+          <p:nvPr>
+            <p:ph idx="1"/>
+          </p:nvPr>
+        </p:nvSpPr>
+        <p:spPr/>
+        <p:txBody>
+          <a:bodyPr>
+            <a:normAutofit fontScale="77500" lnSpcReduction="20000"/>
+          </a:bodyPr>
+          <a:lstStyle/>
+          <a:p>
+            <a:r>
+              <a:rPr lang="en-US" dirty="0" smtClean="0"/>
+              <a:t>Security groups provide a security layer around EC2 instances</a:t>
+            </a:r>
+          </a:p>
+          <a:p>
+            <a:pPr lvl="1"/>
+            <a:r>
+              <a:rPr lang="en-US" dirty="0" smtClean="0"/>
+              <a:t>Define a set of IP addresses and protocols that can send data to and from servers</a:t>
+            </a:r>
+          </a:p>
+          <a:p>
+            <a:pPr lvl="1"/>
+            <a:r>
+              <a:rPr lang="en-US" dirty="0" smtClean="0"/>
+              <a:t>It’s like a basic firewall system</a:t>
+            </a:r>
+          </a:p>
+          <a:p>
+            <a:r>
+              <a:rPr lang="en-US" dirty="0" smtClean="0"/>
+              <a:t>Default security group</a:t>
+            </a:r>
+          </a:p>
+          <a:p>
+            <a:pPr lvl="1"/>
+            <a:r>
+              <a:rPr lang="en-US" dirty="0" smtClean="0"/>
+              <a:t>All inbound traffic blocked</a:t>
+            </a:r>
+          </a:p>
+          <a:p>
+            <a:pPr lvl="1"/>
+            <a:r>
+              <a:rPr lang="en-US" dirty="0" smtClean="0"/>
+              <a:t>All outbound traffic allowed</a:t>
+            </a:r>
+          </a:p>
+          <a:p>
+            <a:r>
+              <a:rPr lang="en-US" dirty="0" smtClean="0"/>
+              <a:t>Security groups are </a:t>
+            </a:r>
+            <a:r>
+              <a:rPr lang="en-US" u="sng" dirty="0" err="1" smtClean="0"/>
+              <a:t>stateful</a:t>
+            </a:r>
+            <a:r>
+              <a:rPr lang="en-US" dirty="0" smtClean="0"/>
+              <a:t> meaning that responses from allowed connections are valid</a:t>
+            </a:r>
+          </a:p>
+          <a:p>
+            <a:pPr lvl="1"/>
+            <a:r>
+              <a:rPr lang="en-US" dirty="0" smtClean="0"/>
+              <a:t>Server can initiate outbound web request and receive an inbound response even if port 80 (http) incoming traffic is blocked</a:t>
+            </a:r>
+          </a:p>
+          <a:p>
+            <a:endParaRPr lang="en-US" dirty="0"/>
+          </a:p>
+        </p:txBody>
+      </p:sp>
+    </p:spTree>
+    <p:extLst>
+      <p:ext uri="{BB962C8B-B14F-4D97-AF65-F5344CB8AC3E}">
+        <p14:creationId xmlns:p14="http://schemas.microsoft.com/office/powerpoint/2010/main" val="4029850890"/>
+      </p:ext>
+    </p:extLst>
+  </p:cSld>
+  <p:clrMapOvr>
+    <a:masterClrMapping/>
+  </p:clrMapOvr>
+</p:sld>
+</file>
+
+<file path=ppt/slides/slide41.xml><?xml version="1.0" encoding="utf-8"?>
+<p:sld xmlns:a="http://schemas.openxmlformats.org/drawingml/2006/main" xmlns:r="http://schemas.openxmlformats.org/officeDocument/2006/relationships" xmlns:p="http://schemas.openxmlformats.org/presentationml/2006/main">
+  <p:cSld>
+    <p:spTree>
+      <p:nvGrpSpPr>
+        <p:cNvPr id="1" name=""/>
+        <p:cNvGrpSpPr/>
+        <p:nvPr/>
+      </p:nvGrpSpPr>
+      <p:grpSpPr>
+        <a:xfrm>
+          <a:off x="0" y="0"/>
+          <a:ext cx="0" cy="0"/>
+          <a:chOff x="0" y="0"/>
+          <a:chExt cx="0" cy="0"/>
+        </a:xfrm>
+      </p:grpSpPr>
+      <p:sp>
+        <p:nvSpPr>
+          <p:cNvPr id="2" name="Title 1"/>
+          <p:cNvSpPr>
+            <a:spLocks noGrp="1"/>
+          </p:cNvSpPr>
+          <p:nvPr>
+            <p:ph type="title"/>
+          </p:nvPr>
+        </p:nvSpPr>
+        <p:spPr/>
+        <p:txBody>
+          <a:bodyPr/>
+          <a:lstStyle/>
+          <a:p>
+            <a:r>
+              <a:rPr lang="en-US" dirty="0" smtClean="0"/>
+              <a:t>Security Groups</a:t>
+            </a:r>
+            <a:endParaRPr lang="en-US" dirty="0"/>
+          </a:p>
+        </p:txBody>
+      </p:sp>
+      <p:grpSp>
+        <p:nvGrpSpPr>
+          <p:cNvPr id="16" name="Group 15"/>
+          <p:cNvGrpSpPr/>
+          <p:nvPr/>
+        </p:nvGrpSpPr>
+        <p:grpSpPr>
+          <a:xfrm>
+            <a:off x="2608485" y="1544659"/>
+            <a:ext cx="6334238" cy="4959423"/>
+            <a:chOff x="1128889" y="1651000"/>
+            <a:chExt cx="7140222" cy="4750106"/>
+          </a:xfrm>
+        </p:grpSpPr>
+        <p:sp>
+          <p:nvSpPr>
+            <p:cNvPr id="4" name="Rounded Rectangle 3"/>
+            <p:cNvSpPr/>
+            <p:nvPr/>
+          </p:nvSpPr>
+          <p:spPr>
+            <a:xfrm>
+              <a:off x="1128889" y="1651000"/>
+              <a:ext cx="7140222" cy="4727222"/>
+            </a:xfrm>
+            <a:prstGeom prst="roundRect">
+              <a:avLst/>
+            </a:prstGeom>
+          </p:spPr>
+          <p:style>
+            <a:lnRef idx="1">
+              <a:schemeClr val="accent6"/>
+            </a:lnRef>
+            <a:fillRef idx="2">
+              <a:schemeClr val="accent6"/>
+            </a:fillRef>
+            <a:effectRef idx="1">
+              <a:schemeClr val="accent6"/>
+            </a:effectRef>
+            <a:fontRef idx="minor">
+              <a:schemeClr val="dk1"/>
+            </a:fontRef>
+          </p:style>
+          <p:txBody>
+            <a:bodyPr rtlCol="0" anchor="ctr"/>
+            <a:lstStyle/>
+            <a:p>
+              <a:pPr algn="ctr"/>
+              <a:endParaRPr lang="en-US" dirty="0"/>
+            </a:p>
+          </p:txBody>
+        </p:sp>
+        <p:sp>
+          <p:nvSpPr>
+            <p:cNvPr id="5" name="Rounded Rectangle 4"/>
+            <p:cNvSpPr/>
+            <p:nvPr/>
+          </p:nvSpPr>
+          <p:spPr>
+            <a:xfrm>
+              <a:off x="1590258" y="2460013"/>
+              <a:ext cx="2917385" cy="3455459"/>
+            </a:xfrm>
+            <a:prstGeom prst="roundRect">
+              <a:avLst/>
+            </a:prstGeom>
+          </p:spPr>
+          <p:style>
+            <a:lnRef idx="1">
+              <a:schemeClr val="accent1"/>
+            </a:lnRef>
+            <a:fillRef idx="3">
+              <a:schemeClr val="accent1"/>
+            </a:fillRef>
+            <a:effectRef idx="2">
+              <a:schemeClr val="accent1"/>
+            </a:effectRef>
+            <a:fontRef idx="minor">
+              <a:schemeClr val="lt1"/>
+            </a:fontRef>
+          </p:style>
+          <p:txBody>
+            <a:bodyPr rtlCol="0" anchor="ctr"/>
+            <a:lstStyle/>
+            <a:p>
+              <a:pPr algn="ctr"/>
+              <a:endParaRPr lang="en-US" dirty="0"/>
+            </a:p>
+          </p:txBody>
+        </p:sp>
+        <p:sp>
+          <p:nvSpPr>
+            <p:cNvPr id="6" name="Rounded Rectangle 5"/>
+            <p:cNvSpPr/>
+            <p:nvPr/>
+          </p:nvSpPr>
+          <p:spPr>
+            <a:xfrm>
+              <a:off x="5014708" y="2463669"/>
+              <a:ext cx="2917385" cy="3455459"/>
+            </a:xfrm>
+            <a:prstGeom prst="roundRect">
+              <a:avLst/>
+            </a:prstGeom>
+          </p:spPr>
+          <p:style>
+            <a:lnRef idx="1">
+              <a:schemeClr val="accent1"/>
+            </a:lnRef>
+            <a:fillRef idx="3">
+              <a:schemeClr val="accent1"/>
+            </a:fillRef>
+            <a:effectRef idx="2">
+              <a:schemeClr val="accent1"/>
+            </a:effectRef>
+            <a:fontRef idx="minor">
+              <a:schemeClr val="lt1"/>
+            </a:fontRef>
+          </p:style>
+          <p:txBody>
+            <a:bodyPr rtlCol="0" anchor="ctr"/>
+            <a:lstStyle/>
+            <a:p>
+              <a:pPr algn="ctr"/>
+              <a:endParaRPr lang="en-US"/>
+            </a:p>
+          </p:txBody>
+        </p:sp>
+        <p:sp>
+          <p:nvSpPr>
+            <p:cNvPr id="7" name="TextBox 6"/>
+            <p:cNvSpPr txBox="1"/>
+            <p:nvPr/>
+          </p:nvSpPr>
+          <p:spPr>
+            <a:xfrm>
+              <a:off x="4445321" y="6031774"/>
+              <a:ext cx="569387" cy="369332"/>
+            </a:xfrm>
+            <a:prstGeom prst="rect">
+              <a:avLst/>
+            </a:prstGeom>
+            <a:noFill/>
+          </p:spPr>
+          <p:txBody>
+            <a:bodyPr wrap="none" rtlCol="0">
+              <a:spAutoFit/>
+            </a:bodyPr>
+            <a:lstStyle/>
+            <a:p>
+              <a:r>
+                <a:rPr lang="en-US" dirty="0" smtClean="0"/>
+                <a:t>VPC</a:t>
+              </a:r>
+              <a:endParaRPr lang="en-US" dirty="0"/>
+            </a:p>
+          </p:txBody>
+        </p:sp>
+        <p:sp>
+          <p:nvSpPr>
+            <p:cNvPr id="8" name="TextBox 7"/>
+            <p:cNvSpPr txBox="1"/>
+            <p:nvPr/>
+          </p:nvSpPr>
+          <p:spPr>
+            <a:xfrm>
+              <a:off x="1964685" y="2574432"/>
+              <a:ext cx="2075959" cy="369332"/>
+            </a:xfrm>
+            <a:prstGeom prst="rect">
+              <a:avLst/>
+            </a:prstGeom>
+            <a:noFill/>
+          </p:spPr>
+          <p:txBody>
+            <a:bodyPr wrap="none" rtlCol="0">
+              <a:spAutoFit/>
+            </a:bodyPr>
+            <a:lstStyle/>
+            <a:p>
+              <a:r>
+                <a:rPr lang="en-US" dirty="0" smtClean="0"/>
+                <a:t>Web Security Group</a:t>
+              </a:r>
+              <a:endParaRPr lang="en-US" dirty="0"/>
+            </a:p>
+          </p:txBody>
+        </p:sp>
+        <p:sp>
+          <p:nvSpPr>
+            <p:cNvPr id="9" name="TextBox 8"/>
+            <p:cNvSpPr txBox="1"/>
+            <p:nvPr/>
+          </p:nvSpPr>
+          <p:spPr>
+            <a:xfrm>
+              <a:off x="5472337" y="2581278"/>
+              <a:ext cx="1902046" cy="369332"/>
+            </a:xfrm>
+            <a:prstGeom prst="rect">
+              <a:avLst/>
+            </a:prstGeom>
+            <a:noFill/>
+          </p:spPr>
+          <p:txBody>
+            <a:bodyPr wrap="none" rtlCol="0">
+              <a:spAutoFit/>
+            </a:bodyPr>
+            <a:lstStyle/>
+            <a:p>
+              <a:r>
+                <a:rPr lang="en-US" dirty="0" smtClean="0"/>
+                <a:t>DB Security Group</a:t>
+              </a:r>
+              <a:endParaRPr lang="en-US" dirty="0"/>
+            </a:p>
+          </p:txBody>
+        </p:sp>
+        <p:sp>
+          <p:nvSpPr>
+            <p:cNvPr id="10" name="Rounded Rectangle 9"/>
+            <p:cNvSpPr/>
+            <p:nvPr/>
+          </p:nvSpPr>
+          <p:spPr>
+            <a:xfrm>
+              <a:off x="2093652" y="3249505"/>
+              <a:ext cx="853639" cy="755167"/>
+            </a:xfrm>
+            <a:prstGeom prst="roundRect">
+              <a:avLst/>
+            </a:prstGeom>
+          </p:spPr>
+          <p:style>
+            <a:lnRef idx="1">
+              <a:schemeClr val="accent2"/>
+            </a:lnRef>
+            <a:fillRef idx="3">
+              <a:schemeClr val="accent2"/>
+            </a:fillRef>
+            <a:effectRef idx="2">
+              <a:schemeClr val="accent2"/>
+            </a:effectRef>
+            <a:fontRef idx="minor">
+              <a:schemeClr val="lt1"/>
+            </a:fontRef>
+          </p:style>
+          <p:txBody>
+            <a:bodyPr rtlCol="0" anchor="ctr"/>
+            <a:lstStyle/>
+            <a:p>
+              <a:pPr algn="ctr"/>
+              <a:r>
+                <a:rPr lang="en-US" sz="1000" dirty="0" smtClean="0"/>
+                <a:t>Instance</a:t>
+              </a:r>
+              <a:endParaRPr lang="en-US" sz="1000" dirty="0"/>
+            </a:p>
+          </p:txBody>
+        </p:sp>
+        <p:sp>
+          <p:nvSpPr>
+            <p:cNvPr id="11" name="Rounded Rectangle 10"/>
+            <p:cNvSpPr/>
+            <p:nvPr/>
+          </p:nvSpPr>
+          <p:spPr>
+            <a:xfrm>
+              <a:off x="3317382" y="4473313"/>
+              <a:ext cx="867970" cy="755167"/>
+            </a:xfrm>
+            <a:prstGeom prst="roundRect">
+              <a:avLst/>
+            </a:prstGeom>
+          </p:spPr>
+          <p:style>
+            <a:lnRef idx="1">
+              <a:schemeClr val="accent2"/>
+            </a:lnRef>
+            <a:fillRef idx="3">
+              <a:schemeClr val="accent2"/>
+            </a:fillRef>
+            <a:effectRef idx="2">
+              <a:schemeClr val="accent2"/>
+            </a:effectRef>
+            <a:fontRef idx="minor">
+              <a:schemeClr val="lt1"/>
+            </a:fontRef>
+          </p:style>
+          <p:txBody>
+            <a:bodyPr rtlCol="0" anchor="ctr"/>
+            <a:lstStyle/>
+            <a:p>
+              <a:pPr algn="ctr"/>
+              <a:r>
+                <a:rPr lang="en-US" sz="1100" dirty="0" smtClean="0"/>
+                <a:t>Instance</a:t>
+              </a:r>
+              <a:endParaRPr lang="en-US" sz="1100" dirty="0"/>
+            </a:p>
+          </p:txBody>
+        </p:sp>
+        <p:sp>
+          <p:nvSpPr>
+            <p:cNvPr id="12" name="Rounded Rectangle 11"/>
+            <p:cNvSpPr/>
+            <p:nvPr/>
+          </p:nvSpPr>
+          <p:spPr>
+            <a:xfrm>
+              <a:off x="2093653" y="4461394"/>
+              <a:ext cx="853638" cy="755167"/>
+            </a:xfrm>
+            <a:prstGeom prst="roundRect">
+              <a:avLst/>
+            </a:prstGeom>
+          </p:spPr>
+          <p:style>
+            <a:lnRef idx="1">
+              <a:schemeClr val="accent2"/>
+            </a:lnRef>
+            <a:fillRef idx="3">
+              <a:schemeClr val="accent2"/>
+            </a:fillRef>
+            <a:effectRef idx="2">
+              <a:schemeClr val="accent2"/>
+            </a:effectRef>
+            <a:fontRef idx="minor">
+              <a:schemeClr val="lt1"/>
+            </a:fontRef>
+          </p:style>
+          <p:txBody>
+            <a:bodyPr rtlCol="0" anchor="ctr"/>
+            <a:lstStyle/>
+            <a:p>
+              <a:pPr algn="ctr"/>
+              <a:r>
+                <a:rPr lang="en-US" sz="1100" dirty="0" smtClean="0"/>
+                <a:t>Instance</a:t>
+              </a:r>
+              <a:endParaRPr lang="en-US" sz="1100" dirty="0"/>
+            </a:p>
+          </p:txBody>
+        </p:sp>
+        <p:sp>
+          <p:nvSpPr>
+            <p:cNvPr id="13" name="Rounded Rectangle 12"/>
+            <p:cNvSpPr/>
+            <p:nvPr/>
+          </p:nvSpPr>
+          <p:spPr>
+            <a:xfrm>
+              <a:off x="3317381" y="3233931"/>
+              <a:ext cx="867971" cy="755167"/>
+            </a:xfrm>
+            <a:prstGeom prst="roundRect">
+              <a:avLst/>
+            </a:prstGeom>
+          </p:spPr>
+          <p:style>
+            <a:lnRef idx="1">
+              <a:schemeClr val="accent2"/>
+            </a:lnRef>
+            <a:fillRef idx="3">
+              <a:schemeClr val="accent2"/>
+            </a:fillRef>
+            <a:effectRef idx="2">
+              <a:schemeClr val="accent2"/>
+            </a:effectRef>
+            <a:fontRef idx="minor">
+              <a:schemeClr val="lt1"/>
+            </a:fontRef>
+          </p:style>
+          <p:txBody>
+            <a:bodyPr rtlCol="0" anchor="ctr"/>
+            <a:lstStyle/>
+            <a:p>
+              <a:pPr algn="ctr"/>
+              <a:r>
+                <a:rPr lang="en-US" sz="1100" dirty="0" smtClean="0"/>
+                <a:t>Instance</a:t>
+              </a:r>
+              <a:endParaRPr lang="en-US" sz="1100" dirty="0"/>
+            </a:p>
+          </p:txBody>
+        </p:sp>
+        <p:sp>
+          <p:nvSpPr>
+            <p:cNvPr id="14" name="Rounded Rectangle 13"/>
+            <p:cNvSpPr/>
+            <p:nvPr/>
+          </p:nvSpPr>
+          <p:spPr>
+            <a:xfrm>
+              <a:off x="6619295" y="3176721"/>
+              <a:ext cx="867555" cy="755167"/>
+            </a:xfrm>
+            <a:prstGeom prst="roundRect">
+              <a:avLst/>
+            </a:prstGeom>
+          </p:spPr>
+          <p:style>
+            <a:lnRef idx="1">
+              <a:schemeClr val="accent2"/>
+            </a:lnRef>
+            <a:fillRef idx="3">
+              <a:schemeClr val="accent2"/>
+            </a:fillRef>
+            <a:effectRef idx="2">
+              <a:schemeClr val="accent2"/>
+            </a:effectRef>
+            <a:fontRef idx="minor">
+              <a:schemeClr val="lt1"/>
+            </a:fontRef>
+          </p:style>
+          <p:txBody>
+            <a:bodyPr rtlCol="0" anchor="ctr"/>
+            <a:lstStyle/>
+            <a:p>
+              <a:pPr algn="ctr"/>
+              <a:r>
+                <a:rPr lang="en-US" sz="1100" dirty="0" smtClean="0"/>
+                <a:t>Instance</a:t>
+              </a:r>
+              <a:endParaRPr lang="en-US" sz="1100" dirty="0"/>
+            </a:p>
+          </p:txBody>
+        </p:sp>
+        <p:sp>
+          <p:nvSpPr>
+            <p:cNvPr id="15" name="Rounded Rectangle 14"/>
+            <p:cNvSpPr/>
+            <p:nvPr/>
+          </p:nvSpPr>
+          <p:spPr>
+            <a:xfrm>
+              <a:off x="5372611" y="3176721"/>
+              <a:ext cx="876177" cy="755167"/>
+            </a:xfrm>
+            <a:prstGeom prst="roundRect">
+              <a:avLst/>
+            </a:prstGeom>
+          </p:spPr>
+          <p:style>
+            <a:lnRef idx="1">
+              <a:schemeClr val="accent2"/>
+            </a:lnRef>
+            <a:fillRef idx="3">
+              <a:schemeClr val="accent2"/>
+            </a:fillRef>
+            <a:effectRef idx="2">
+              <a:schemeClr val="accent2"/>
+            </a:effectRef>
+            <a:fontRef idx="minor">
+              <a:schemeClr val="lt1"/>
+            </a:fontRef>
+          </p:style>
+          <p:txBody>
+            <a:bodyPr rtlCol="0" anchor="ctr"/>
+            <a:lstStyle/>
+            <a:p>
+              <a:pPr algn="ctr"/>
+              <a:r>
+                <a:rPr lang="en-US" sz="1100" dirty="0" smtClean="0"/>
+                <a:t>Instance</a:t>
+              </a:r>
+              <a:endParaRPr lang="en-US" sz="1100" dirty="0"/>
+            </a:p>
+          </p:txBody>
+        </p:sp>
+      </p:grpSp>
+      <p:sp>
+        <p:nvSpPr>
+          <p:cNvPr id="17" name="TextBox 16"/>
+          <p:cNvSpPr txBox="1"/>
+          <p:nvPr/>
+        </p:nvSpPr>
+        <p:spPr>
+          <a:xfrm>
+            <a:off x="217374" y="1417639"/>
+            <a:ext cx="2299586" cy="2585323"/>
+          </a:xfrm>
+          <a:prstGeom prst="rect">
+            <a:avLst/>
+          </a:prstGeom>
+          <a:noFill/>
+        </p:spPr>
+        <p:txBody>
+          <a:bodyPr wrap="square" rtlCol="0">
+            <a:spAutoFit/>
+          </a:bodyPr>
+          <a:lstStyle/>
+          <a:p>
+            <a:pPr marL="285750" indent="-285750">
+              <a:buFont typeface="Arial"/>
+              <a:buChar char="•"/>
+            </a:pPr>
+            <a:r>
+              <a:rPr lang="en-US" dirty="0" smtClean="0"/>
+              <a:t>SG can contain any number of EC2 instances</a:t>
+            </a:r>
+          </a:p>
+          <a:p>
+            <a:pPr marL="285750" indent="-285750">
+              <a:buFont typeface="Arial"/>
+              <a:buChar char="•"/>
+            </a:pPr>
+            <a:endParaRPr lang="en-US" dirty="0"/>
+          </a:p>
+          <a:p>
+            <a:pPr marL="285750" indent="-285750">
+              <a:buFont typeface="Arial"/>
+              <a:buChar char="•"/>
+            </a:pPr>
+            <a:r>
+              <a:rPr lang="en-US" dirty="0" smtClean="0"/>
+              <a:t>An EC2 instance may be associated with up to 5 different security groups</a:t>
+            </a:r>
+            <a:endParaRPr lang="en-US" dirty="0"/>
+          </a:p>
+        </p:txBody>
+      </p:sp>
+      <p:sp>
+        <p:nvSpPr>
+          <p:cNvPr id="18" name="TextBox 17"/>
+          <p:cNvSpPr txBox="1"/>
+          <p:nvPr/>
+        </p:nvSpPr>
+        <p:spPr>
+          <a:xfrm>
+            <a:off x="3464347" y="5412027"/>
+            <a:ext cx="1928733" cy="553998"/>
+          </a:xfrm>
+          <a:prstGeom prst="rect">
+            <a:avLst/>
+          </a:prstGeom>
+          <a:noFill/>
+        </p:spPr>
+        <p:txBody>
+          <a:bodyPr wrap="none" rtlCol="0">
+            <a:spAutoFit/>
+          </a:bodyPr>
+          <a:lstStyle/>
+          <a:p>
+            <a:r>
+              <a:rPr lang="en-US" sz="1000" dirty="0" smtClean="0"/>
+              <a:t>Incoming port 80 from 0.0.0.0/0</a:t>
+            </a:r>
+          </a:p>
+          <a:p>
+            <a:r>
+              <a:rPr lang="en-US" sz="1000" dirty="0" smtClean="0"/>
+              <a:t>Incoming port 443 from 0.0.0.0/0</a:t>
+            </a:r>
+          </a:p>
+          <a:p>
+            <a:r>
+              <a:rPr lang="en-US" sz="1000" dirty="0" smtClean="0"/>
+              <a:t>Outgoing any to 0.0.0.0/0</a:t>
+            </a:r>
+            <a:endParaRPr lang="en-US" sz="1000" dirty="0"/>
+          </a:p>
+        </p:txBody>
+      </p:sp>
+      <p:sp>
+        <p:nvSpPr>
+          <p:cNvPr id="19" name="TextBox 18"/>
+          <p:cNvSpPr txBox="1"/>
+          <p:nvPr/>
+        </p:nvSpPr>
+        <p:spPr>
+          <a:xfrm>
+            <a:off x="6461647" y="5391140"/>
+            <a:ext cx="1992853" cy="553998"/>
+          </a:xfrm>
+          <a:prstGeom prst="rect">
+            <a:avLst/>
+          </a:prstGeom>
+          <a:noFill/>
+        </p:spPr>
+        <p:txBody>
+          <a:bodyPr wrap="none" rtlCol="0">
+            <a:spAutoFit/>
+          </a:bodyPr>
+          <a:lstStyle/>
+          <a:p>
+            <a:r>
+              <a:rPr lang="en-US" sz="1000" dirty="0" smtClean="0"/>
+              <a:t>Incoming port 3306 from Web SG</a:t>
+            </a:r>
+          </a:p>
+          <a:p>
+            <a:r>
+              <a:rPr lang="en-US" sz="1000" dirty="0" smtClean="0"/>
+              <a:t>Incoming port 22 from Web SG</a:t>
+            </a:r>
+          </a:p>
+          <a:p>
+            <a:r>
+              <a:rPr lang="en-US" sz="1000" dirty="0" smtClean="0"/>
+              <a:t>Outgoing port 80 to Web SG</a:t>
+            </a:r>
+            <a:endParaRPr lang="en-US" sz="1000" dirty="0"/>
+          </a:p>
+        </p:txBody>
+      </p:sp>
+    </p:spTree>
+    <p:extLst>
+      <p:ext uri="{BB962C8B-B14F-4D97-AF65-F5344CB8AC3E}">
+        <p14:creationId xmlns:p14="http://schemas.microsoft.com/office/powerpoint/2010/main" val="2655148752"/>
+      </p:ext>
+    </p:extLst>
+  </p:cSld>
+  <p:clrMapOvr>
+    <a:masterClrMapping/>
+  </p:clrMapOvr>
+</p:sld>
+</file>
+
+<file path=ppt/slides/slide42.xml><?xml version="1.0" encoding="utf-8"?>
+<p:sld xmlns:a="http://schemas.openxmlformats.org/drawingml/2006/main" xmlns:r="http://schemas.openxmlformats.org/officeDocument/2006/relationships" xmlns:p="http://schemas.openxmlformats.org/presentationml/2006/main">
+  <p:cSld>
+    <p:spTree>
+      <p:nvGrpSpPr>
+        <p:cNvPr id="1" name=""/>
+        <p:cNvGrpSpPr/>
+        <p:nvPr/>
+      </p:nvGrpSpPr>
+      <p:grpSpPr>
+        <a:xfrm>
+          <a:off x="0" y="0"/>
+          <a:ext cx="0" cy="0"/>
+          <a:chOff x="0" y="0"/>
+          <a:chExt cx="0" cy="0"/>
+        </a:xfrm>
+      </p:grpSpPr>
+      <p:sp>
+        <p:nvSpPr>
+          <p:cNvPr id="2" name="Title 1"/>
+          <p:cNvSpPr>
+            <a:spLocks noGrp="1"/>
+          </p:cNvSpPr>
+          <p:nvPr>
+            <p:ph type="title"/>
+          </p:nvPr>
+        </p:nvSpPr>
+        <p:spPr/>
+        <p:txBody>
           <a:bodyPr>
             <a:normAutofit/>
           </a:bodyPr>

</xml_diff>

<commit_message>
working on assignment 5
</commit_message>
<xml_diff>
--- a/infrastructure-week-4.pptx
+++ b/infrastructure-week-4.pptx
@@ -6520,7 +6520,11 @@
             </a:br>
             <a:r>
               <a:rPr lang="en-US" sz="6000" dirty="0" smtClean="0"/>
-              <a:t>Week 12</a:t>
+              <a:t>Week </a:t>
+            </a:r>
+            <a:r>
+              <a:rPr lang="en-US" sz="6000" dirty="0" smtClean="0"/>
+              <a:t>4</a:t>
             </a:r>
             <a:endParaRPr lang="en-US" sz="6000" dirty="0"/>
           </a:p>
@@ -12576,11 +12580,11 @@
           <a:lstStyle/>
           <a:p>
             <a:r>
-              <a:rPr lang="en-US" smtClean="0"/>
+              <a:rPr lang="en-US" dirty="0" smtClean="0"/>
               <a:t>Assignment </a:t>
             </a:r>
             <a:r>
-              <a:rPr lang="en-US" smtClean="0"/>
+              <a:rPr lang="en-US" dirty="0" smtClean="0"/>
               <a:t>4</a:t>
             </a:r>
             <a:endParaRPr lang="en-US" dirty="0" smtClean="0"/>

</xml_diff>

<commit_message>
update devops presentation and syllabus
</commit_message>
<xml_diff>
--- a/infrastructure-week-4.pptx
+++ b/infrastructure-week-4.pptx
@@ -6657,6 +6657,13 @@
   <p:clrMapOvr>
     <a:masterClrMapping/>
   </p:clrMapOvr>
+  <p:timing>
+    <p:tnLst>
+      <p:par>
+        <p:cTn xmlns:p14="http://schemas.microsoft.com/office/powerpoint/2010/main" id="1" dur="indefinite" restart="never" nodeType="tmRoot"/>
+      </p:par>
+    </p:tnLst>
+  </p:timing>
 </p:sld>
 </file>
 
@@ -6734,6 +6741,13 @@
   <p:clrMapOvr>
     <a:masterClrMapping/>
   </p:clrMapOvr>
+  <p:timing>
+    <p:tnLst>
+      <p:par>
+        <p:cTn xmlns:p14="http://schemas.microsoft.com/office/powerpoint/2010/main" id="1" dur="indefinite" restart="never" nodeType="tmRoot"/>
+      </p:par>
+    </p:tnLst>
+  </p:timing>
 </p:sld>
 </file>
 
@@ -6788,6 +6802,13 @@
   <p:clrMapOvr>
     <a:masterClrMapping/>
   </p:clrMapOvr>
+  <p:timing>
+    <p:tnLst>
+      <p:par>
+        <p:cTn xmlns:p14="http://schemas.microsoft.com/office/powerpoint/2010/main" id="1" dur="indefinite" restart="never" nodeType="tmRoot"/>
+      </p:par>
+    </p:tnLst>
+  </p:timing>
 </p:sld>
 </file>
 
@@ -6936,6 +6957,13 @@
   <p:clrMapOvr>
     <a:masterClrMapping/>
   </p:clrMapOvr>
+  <p:timing>
+    <p:tnLst>
+      <p:par>
+        <p:cTn xmlns:p14="http://schemas.microsoft.com/office/powerpoint/2010/main" id="1" dur="indefinite" restart="never" nodeType="tmRoot"/>
+      </p:par>
+    </p:tnLst>
+  </p:timing>
 </p:sld>
 </file>
 
@@ -8384,6 +8412,13 @@
   <p:clrMapOvr>
     <a:masterClrMapping/>
   </p:clrMapOvr>
+  <p:timing>
+    <p:tnLst>
+      <p:par>
+        <p:cTn xmlns:p14="http://schemas.microsoft.com/office/powerpoint/2010/main" id="1" dur="indefinite" restart="never" nodeType="tmRoot"/>
+      </p:par>
+    </p:tnLst>
+  </p:timing>
 </p:sld>
 </file>
 
@@ -9833,7 +9868,15 @@
             <a:pPr lvl="1"/>
             <a:r>
               <a:rPr lang="en-US" dirty="0" smtClean="0"/>
-              <a:t>Once a bucket is enabled, it cannot be disabled only suspended</a:t>
+              <a:t>Once </a:t>
+            </a:r>
+            <a:r>
+              <a:rPr lang="en-US" dirty="0" smtClean="0"/>
+              <a:t>versioning on a </a:t>
+            </a:r>
+            <a:r>
+              <a:rPr lang="en-US" dirty="0" smtClean="0"/>
+              <a:t>bucket is enabled, it cannot be disabled only suspended</a:t>
             </a:r>
           </a:p>
           <a:p>
@@ -10169,6 +10212,13 @@
   <p:clrMapOvr>
     <a:masterClrMapping/>
   </p:clrMapOvr>
+  <p:timing>
+    <p:tnLst>
+      <p:par>
+        <p:cTn xmlns:p14="http://schemas.microsoft.com/office/powerpoint/2010/main" id="1" dur="indefinite" restart="never" nodeType="tmRoot"/>
+      </p:par>
+    </p:tnLst>
+  </p:timing>
 </p:sld>
 </file>
 
@@ -12038,6 +12088,13 @@
   <p:clrMapOvr>
     <a:masterClrMapping/>
   </p:clrMapOvr>
+  <p:timing>
+    <p:tnLst>
+      <p:par>
+        <p:cTn xmlns:p14="http://schemas.microsoft.com/office/powerpoint/2010/main" id="1" dur="indefinite" restart="never" nodeType="tmRoot"/>
+      </p:par>
+    </p:tnLst>
+  </p:timing>
 </p:sld>
 </file>
 
@@ -13696,6 +13753,13 @@
   <p:clrMapOvr>
     <a:masterClrMapping/>
   </p:clrMapOvr>
+  <p:timing>
+    <p:tnLst>
+      <p:par>
+        <p:cTn xmlns:p14="http://schemas.microsoft.com/office/powerpoint/2010/main" id="1" dur="indefinite" restart="never" nodeType="tmRoot"/>
+      </p:par>
+    </p:tnLst>
+  </p:timing>
 </p:sld>
 </file>
 
@@ -13779,6 +13843,13 @@
   <p:clrMapOvr>
     <a:masterClrMapping/>
   </p:clrMapOvr>
+  <p:timing>
+    <p:tnLst>
+      <p:par>
+        <p:cTn xmlns:p14="http://schemas.microsoft.com/office/powerpoint/2010/main" id="1" dur="indefinite" restart="never" nodeType="tmRoot"/>
+      </p:par>
+    </p:tnLst>
+  </p:timing>
 </p:sld>
 </file>
 
@@ -13907,6 +13978,13 @@
   <p:clrMapOvr>
     <a:masterClrMapping/>
   </p:clrMapOvr>
+  <p:timing>
+    <p:tnLst>
+      <p:par>
+        <p:cTn xmlns:p14="http://schemas.microsoft.com/office/powerpoint/2010/main" id="1" dur="indefinite" restart="never" nodeType="tmRoot"/>
+      </p:par>
+    </p:tnLst>
+  </p:timing>
 </p:sld>
 </file>
 
@@ -14016,6 +14094,13 @@
   <p:clrMapOvr>
     <a:masterClrMapping/>
   </p:clrMapOvr>
+  <p:timing>
+    <p:tnLst>
+      <p:par>
+        <p:cTn xmlns:p14="http://schemas.microsoft.com/office/powerpoint/2010/main" id="1" dur="indefinite" restart="never" nodeType="tmRoot"/>
+      </p:par>
+    </p:tnLst>
+  </p:timing>
 </p:sld>
 </file>
 
@@ -14178,6 +14263,13 @@
   <p:clrMapOvr>
     <a:masterClrMapping/>
   </p:clrMapOvr>
+  <p:timing>
+    <p:tnLst>
+      <p:par>
+        <p:cTn xmlns:p14="http://schemas.microsoft.com/office/powerpoint/2010/main" id="1" dur="indefinite" restart="never" nodeType="tmRoot"/>
+      </p:par>
+    </p:tnLst>
+  </p:timing>
 </p:sld>
 </file>
 

</xml_diff>